<commit_message>
Aggiornamento finale dopo la seconda giornata (15.9.25)
</commit_message>
<xml_diff>
--- a/Indice_per_Mediolanum.pptx
+++ b/Indice_per_Mediolanum.pptx
@@ -3391,7 +3391,7 @@
         <p:spPr>
           <a:xfrm>
             <a:off x="174665" y="1727957"/>
-            <a:ext cx="9154275" cy="4708981"/>
+            <a:ext cx="9154275" cy="5016758"/>
           </a:xfrm>
           <a:prstGeom prst="rect">
             <a:avLst/>
@@ -3535,7 +3535,7 @@
             </a:pPr>
             <a:r>
               <a:rPr lang="it-IT" sz="2000" dirty="0"/>
-              <a:t>Modelli ARIMA (partendo dal classico ARMA si aggiunge una variabile differenziale per ottenere la stazionarietà)</a:t>
+              <a:t>Test di stazionarietà di Dickey-Fuller</a:t>
             </a:r>
           </a:p>
           <a:p>
@@ -3545,7 +3545,15 @@
             </a:pPr>
             <a:r>
               <a:rPr lang="it-IT" sz="2000" dirty="0"/>
-              <a:t>Modelli SARIMA (aggiunta della stagionalità)</a:t>
+              <a:t>Test </a:t>
+            </a:r>
+            <a:r>
+              <a:rPr lang="it-IT" sz="2000"/>
+              <a:t>di non-casualità </a:t>
+            </a:r>
+            <a:r>
+              <a:rPr lang="it-IT" sz="2000" dirty="0"/>
+              <a:t>di Granger</a:t>
             </a:r>
           </a:p>
           <a:p>
@@ -3555,7 +3563,7 @@
             </a:pPr>
             <a:r>
               <a:rPr lang="it-IT" sz="2000" dirty="0"/>
-              <a:t>Test di stazionarietà di Dickey-Fuller</a:t>
+              <a:t>Modelli ARIMA (partendo dal classico ARMA si aggiunge una variabile differenziale per ottenere la stazionarietà)</a:t>
             </a:r>
           </a:p>
           <a:p>
@@ -3565,13 +3573,18 @@
             </a:pPr>
             <a:r>
               <a:rPr lang="it-IT" sz="2000" dirty="0"/>
-              <a:t>Test di non-casualità </a:t>
-            </a:r>
-            <a:r>
-              <a:rPr lang="it-IT" sz="2000"/>
-              <a:t>di Granger</a:t>
-            </a:r>
-            <a:endParaRPr lang="it-IT" sz="2000" dirty="0"/>
+              <a:t>Modelli SARIMA (aggiunta della stagionalità)</a:t>
+            </a:r>
+          </a:p>
+          <a:p>
+            <a:pPr marL="342900" indent="-342900">
+              <a:buFont typeface="Arial" panose="020B0604020202020204" pitchFamily="34" charset="0"/>
+              <a:buChar char="•"/>
+            </a:pPr>
+            <a:r>
+              <a:rPr lang="it-IT" sz="2000" dirty="0"/>
+              <a:t>Alternativa: modelli a 2 livelli (ensemble)</a:t>
+            </a:r>
           </a:p>
         </p:txBody>
       </p:sp>
@@ -3824,7 +3837,7 @@
                   <a:srgbClr val="FFC000"/>
                 </a:solidFill>
               </a:rPr>
-              <a:t>https://github.com/antonio-corsi/Corso-TOJ-TS-Mediolanum</a:t>
+              <a:t>https://github.com/antonio-corsi/TOJ-modelli-AR-per-Mediolanum</a:t>
             </a:r>
           </a:p>
         </p:txBody>

</xml_diff>